<commit_message>
Minor slide deck revision
</commit_message>
<xml_diff>
--- a/reports/Machine Learning Process Project - Hardefa Rogonondo.pptx
+++ b/reports/Machine Learning Process Project - Hardefa Rogonondo.pptx
@@ -23102,12 +23102,8 @@
           <a:lstStyle/>
           <a:p>
             <a:r>
-              <a:rPr lang="en-US" dirty="0" err="1"/>
-              <a:t>FastAPI</a:t>
-            </a:r>
-            <a:r>
               <a:rPr lang="en-US" dirty="0"/>
-              <a:t> Backend</a:t>
+              <a:t>FASTAPI BACKEND</a:t>
             </a:r>
             <a:endParaRPr lang="en-ID" dirty="0"/>
           </a:p>
@@ -32614,7 +32610,7 @@
             </a:pPr>
             <a:r>
               <a:rPr lang="en-US" dirty="0"/>
-              <a:t>Identifying and predicting 'bad' loans in a banking institution's portfolio to mitigate financial risk. This problem is tackled by building a machine learning model using Logistic Regression</a:t>
+              <a:t>Identifying and predicting 'bad' loans in a banking institution's portfolio to mitigate financial risk. This problem is tackled by building a machine learning model using Logistic Regression.</a:t>
             </a:r>
           </a:p>
         </p:txBody>
@@ -32697,15 +32693,7 @@
             </a:pPr>
             <a:r>
               <a:rPr lang="en-US" dirty="0"/>
-              <a:t>D</a:t>
-            </a:r>
-            <a:r>
-              <a:rPr lang="en-US"/>
-              <a:t>eveloping </a:t>
-            </a:r>
-            <a:r>
-              <a:rPr lang="en-US" dirty="0"/>
-              <a:t>an Application Programming Interface (API) where a user can input borrower information and immediately get a risk score. The backend of the API utilizes the credit risk prediction model and the frontend is built to be intuitive and easy to use.</a:t>
+              <a:t>Developing an Application Programming Interface (API) where a user can input borrower information and immediately get a risk score. The backend of the API utilizes the credit risk prediction model and the frontend is built to be intuitive and easy to use.</a:t>
             </a:r>
             <a:endParaRPr dirty="0"/>
           </a:p>

</xml_diff>